<commit_message>
added XDJ-XZ and partymix v0.8.1 maps.
</commit_message>
<xml_diff>
--- a/traktor/mapping_party_mix/Source files/PartyMix Mapping - Quick overview.pptx
+++ b/traktor/mapping_party_mix/Source files/PartyMix Mapping - Quick overview.pptx
@@ -290,7 +290,7 @@
             <a:fld id="{1D8BD707-D9CF-40AE-B4C6-C98DA3205C09}" type="datetimeFigureOut">
               <a:rPr lang="en-US" smtClean="0"/>
               <a:pPr/>
-              <a:t>7/27/2019</a:t>
+              <a:t>12/13/2019</a:t>
             </a:fld>
             <a:endParaRPr lang="en-US"/>
           </a:p>
@@ -457,7 +457,7 @@
             <a:fld id="{1D8BD707-D9CF-40AE-B4C6-C98DA3205C09}" type="datetimeFigureOut">
               <a:rPr lang="en-US" smtClean="0"/>
               <a:pPr/>
-              <a:t>7/27/2019</a:t>
+              <a:t>12/13/2019</a:t>
             </a:fld>
             <a:endParaRPr lang="en-US"/>
           </a:p>
@@ -634,7 +634,7 @@
             <a:fld id="{1D8BD707-D9CF-40AE-B4C6-C98DA3205C09}" type="datetimeFigureOut">
               <a:rPr lang="en-US" smtClean="0"/>
               <a:pPr/>
-              <a:t>7/27/2019</a:t>
+              <a:t>12/13/2019</a:t>
             </a:fld>
             <a:endParaRPr lang="en-US"/>
           </a:p>
@@ -801,7 +801,7 @@
             <a:fld id="{1D8BD707-D9CF-40AE-B4C6-C98DA3205C09}" type="datetimeFigureOut">
               <a:rPr lang="en-US" smtClean="0"/>
               <a:pPr/>
-              <a:t>7/27/2019</a:t>
+              <a:t>12/13/2019</a:t>
             </a:fld>
             <a:endParaRPr lang="en-US"/>
           </a:p>
@@ -1044,7 +1044,7 @@
             <a:fld id="{1D8BD707-D9CF-40AE-B4C6-C98DA3205C09}" type="datetimeFigureOut">
               <a:rPr lang="en-US" smtClean="0"/>
               <a:pPr/>
-              <a:t>7/27/2019</a:t>
+              <a:t>12/13/2019</a:t>
             </a:fld>
             <a:endParaRPr lang="en-US"/>
           </a:p>
@@ -1329,7 +1329,7 @@
             <a:fld id="{1D8BD707-D9CF-40AE-B4C6-C98DA3205C09}" type="datetimeFigureOut">
               <a:rPr lang="en-US" smtClean="0"/>
               <a:pPr/>
-              <a:t>7/27/2019</a:t>
+              <a:t>12/13/2019</a:t>
             </a:fld>
             <a:endParaRPr lang="en-US"/>
           </a:p>
@@ -1748,7 +1748,7 @@
             <a:fld id="{1D8BD707-D9CF-40AE-B4C6-C98DA3205C09}" type="datetimeFigureOut">
               <a:rPr lang="en-US" smtClean="0"/>
               <a:pPr/>
-              <a:t>7/27/2019</a:t>
+              <a:t>12/13/2019</a:t>
             </a:fld>
             <a:endParaRPr lang="en-US"/>
           </a:p>
@@ -1863,7 +1863,7 @@
             <a:fld id="{1D8BD707-D9CF-40AE-B4C6-C98DA3205C09}" type="datetimeFigureOut">
               <a:rPr lang="en-US" smtClean="0"/>
               <a:pPr/>
-              <a:t>7/27/2019</a:t>
+              <a:t>12/13/2019</a:t>
             </a:fld>
             <a:endParaRPr lang="en-US"/>
           </a:p>
@@ -1955,7 +1955,7 @@
             <a:fld id="{1D8BD707-D9CF-40AE-B4C6-C98DA3205C09}" type="datetimeFigureOut">
               <a:rPr lang="en-US" smtClean="0"/>
               <a:pPr/>
-              <a:t>7/27/2019</a:t>
+              <a:t>12/13/2019</a:t>
             </a:fld>
             <a:endParaRPr lang="en-US"/>
           </a:p>
@@ -2229,7 +2229,7 @@
             <a:fld id="{1D8BD707-D9CF-40AE-B4C6-C98DA3205C09}" type="datetimeFigureOut">
               <a:rPr lang="en-US" smtClean="0"/>
               <a:pPr/>
-              <a:t>7/27/2019</a:t>
+              <a:t>12/13/2019</a:t>
             </a:fld>
             <a:endParaRPr lang="en-US"/>
           </a:p>
@@ -2479,7 +2479,7 @@
             <a:fld id="{1D8BD707-D9CF-40AE-B4C6-C98DA3205C09}" type="datetimeFigureOut">
               <a:rPr lang="en-US" smtClean="0"/>
               <a:pPr/>
-              <a:t>7/27/2019</a:t>
+              <a:t>12/13/2019</a:t>
             </a:fld>
             <a:endParaRPr lang="en-US"/>
           </a:p>
@@ -2689,7 +2689,7 @@
             <a:fld id="{1D8BD707-D9CF-40AE-B4C6-C98DA3205C09}" type="datetimeFigureOut">
               <a:rPr lang="en-US" smtClean="0"/>
               <a:pPr/>
-              <a:t>7/27/2019</a:t>
+              <a:t>12/13/2019</a:t>
             </a:fld>
             <a:endParaRPr lang="en-US"/>
           </a:p>
@@ -3069,9 +3069,9 @@
         <p:grpSpPr>
           <a:xfrm>
             <a:off x="76200" y="996844"/>
-            <a:ext cx="5105401" cy="4248184"/>
+            <a:ext cx="5198978" cy="4248184"/>
             <a:chOff x="1" y="996844"/>
-            <a:chExt cx="5105401" cy="4248184"/>
+            <a:chExt cx="5198978" cy="4248184"/>
           </a:xfrm>
         </p:grpSpPr>
         <p:pic>
@@ -3122,9 +3122,9 @@
           <p:grpSpPr>
             <a:xfrm>
               <a:off x="1" y="2816333"/>
-              <a:ext cx="5105401" cy="2263275"/>
+              <a:ext cx="5198978" cy="2428302"/>
               <a:chOff x="1" y="2816333"/>
-              <a:chExt cx="5105401" cy="2263275"/>
+              <a:chExt cx="5198978" cy="2428302"/>
             </a:xfrm>
           </p:grpSpPr>
           <p:sp>
@@ -3204,7 +3204,7 @@
                 <a:avLst>
                   <a:gd name="adj1" fmla="val 41417"/>
                   <a:gd name="adj2" fmla="val 106334"/>
-                  <a:gd name="adj3" fmla="val 94254"/>
+                  <a:gd name="adj3" fmla="val 150620"/>
                   <a:gd name="adj4" fmla="val 155312"/>
                 </a:avLst>
               </a:prstGeom>
@@ -3236,12 +3236,20 @@
               <a:lstStyle/>
               <a:p>
                 <a:r>
+                  <a:rPr lang="en-US" sz="1200" b="1" dirty="0" smtClean="0">
+                    <a:solidFill>
+                      <a:schemeClr val="tx1"/>
+                    </a:solidFill>
+                  </a:rPr>
+                  <a:t>Play Pause</a:t>
+                </a:r>
+                <a:r>
                   <a:rPr lang="en-US" sz="1200" dirty="0" smtClean="0">
                     <a:solidFill>
                       <a:schemeClr val="tx1"/>
                     </a:solidFill>
                   </a:rPr>
-                  <a:t>Play Pause / </a:t>
+                  <a:t> / </a:t>
                 </a:r>
                 <a:r>
                   <a:rPr lang="en-US" sz="1200" dirty="0" err="1" smtClean="0">
@@ -3314,12 +3322,20 @@
               <a:lstStyle/>
               <a:p>
                 <a:r>
+                  <a:rPr lang="en-US" sz="1200" b="1" dirty="0" smtClean="0">
+                    <a:solidFill>
+                      <a:schemeClr val="tx1"/>
+                    </a:solidFill>
+                  </a:rPr>
+                  <a:t>Next Page</a:t>
+                </a:r>
+                <a:r>
                   <a:rPr lang="en-US" sz="1200" dirty="0" smtClean="0">
                     <a:solidFill>
                       <a:schemeClr val="tx1"/>
                     </a:solidFill>
                   </a:rPr>
-                  <a:t>Next Page, </a:t>
+                  <a:t>, </a:t>
                 </a:r>
                 <a:r>
                   <a:rPr lang="en-US" sz="1200" dirty="0" err="1" smtClean="0">
@@ -3335,7 +3351,7 @@
                       <a:schemeClr val="tx1"/>
                     </a:solidFill>
                   </a:rPr>
-                  <a:t> Cues, </a:t>
+                  <a:t> </a:t>
                 </a:r>
                 <a:r>
                   <a:rPr lang="en-US" sz="1200" dirty="0" err="1" smtClean="0">
@@ -3343,15 +3359,7 @@
                       <a:schemeClr val="tx1"/>
                     </a:solidFill>
                   </a:rPr>
-                  <a:t>Goto</a:t>
-                </a:r>
-                <a:r>
-                  <a:rPr lang="en-US" sz="1200" dirty="0" smtClean="0">
-                    <a:solidFill>
-                      <a:schemeClr val="tx1"/>
-                    </a:solidFill>
-                  </a:rPr>
-                  <a:t> Index</a:t>
+                  <a:t>ColorFX</a:t>
                 </a:r>
                 <a:endParaRPr lang="en-US" sz="1200" dirty="0">
                   <a:solidFill>
@@ -3369,15 +3377,15 @@
             </p:nvSpPr>
             <p:spPr>
               <a:xfrm flipH="1">
-                <a:off x="4184031" y="4748769"/>
-                <a:ext cx="774548" cy="330839"/>
+                <a:off x="4184029" y="4913796"/>
+                <a:ext cx="1014950" cy="330839"/>
               </a:xfrm>
               <a:prstGeom prst="accentCallout1">
                 <a:avLst>
                   <a:gd name="adj1" fmla="val 41417"/>
                   <a:gd name="adj2" fmla="val 106334"/>
-                  <a:gd name="adj3" fmla="val 20844"/>
-                  <a:gd name="adj4" fmla="val 232984"/>
+                  <a:gd name="adj3" fmla="val -16690"/>
+                  <a:gd name="adj4" fmla="val 215188"/>
                 </a:avLst>
               </a:prstGeom>
               <a:noFill/>
@@ -3408,12 +3416,20 @@
               <a:lstStyle/>
               <a:p>
                 <a:r>
+                  <a:rPr lang="en-US" sz="1200" b="1" dirty="0" smtClean="0">
+                    <a:solidFill>
+                      <a:schemeClr val="tx1"/>
+                    </a:solidFill>
+                  </a:rPr>
+                  <a:t>Cue</a:t>
+                </a:r>
+                <a:r>
                   <a:rPr lang="en-US" sz="1200" dirty="0" smtClean="0">
                     <a:solidFill>
                       <a:schemeClr val="tx1"/>
                     </a:solidFill>
                   </a:rPr>
-                  <a:t>Cue / </a:t>
+                  <a:t> / </a:t>
                 </a:r>
                 <a:br>
                   <a:rPr lang="en-US" sz="1200" dirty="0" smtClean="0">
@@ -3428,7 +3444,31 @@
                       <a:schemeClr val="tx1"/>
                     </a:solidFill>
                   </a:rPr>
-                  <a:t>FX Grid ++ </a:t>
+                  <a:t>Pad </a:t>
+                </a:r>
+                <a:r>
+                  <a:rPr lang="en-US" sz="1200" dirty="0" err="1" smtClean="0">
+                    <a:solidFill>
+                      <a:schemeClr val="tx1"/>
+                    </a:solidFill>
+                  </a:rPr>
+                  <a:t>Param</a:t>
+                </a:r>
+                <a:r>
+                  <a:rPr lang="en-US" sz="1200" dirty="0" smtClean="0">
+                    <a:solidFill>
+                      <a:schemeClr val="tx1"/>
+                    </a:solidFill>
+                  </a:rPr>
+                  <a:t> </a:t>
+                </a:r>
+                <a:r>
+                  <a:rPr lang="en-US" sz="1200" dirty="0" smtClean="0">
+                    <a:solidFill>
+                      <a:schemeClr val="tx1"/>
+                    </a:solidFill>
+                  </a:rPr>
+                  <a:t>++ </a:t>
                 </a:r>
                 <a:endParaRPr lang="en-US" sz="1200" dirty="0">
                   <a:solidFill>
@@ -3486,12 +3526,20 @@
               <a:p>
                 <a:pPr algn="r"/>
                 <a:r>
+                  <a:rPr lang="en-US" sz="1200" b="1" dirty="0" smtClean="0">
+                    <a:solidFill>
+                      <a:schemeClr val="tx1"/>
+                    </a:solidFill>
+                  </a:rPr>
+                  <a:t>Temp / </a:t>
+                </a:r>
+                <a:r>
                   <a:rPr lang="en-US" sz="1200" dirty="0" smtClean="0">
                     <a:solidFill>
                       <a:schemeClr val="tx1"/>
                     </a:solidFill>
                   </a:rPr>
-                  <a:t>Tempo, Zoom, Tempo Range</a:t>
+                  <a:t> Zoom .Range</a:t>
                 </a:r>
                 <a:endParaRPr lang="en-US" sz="1200" dirty="0">
                   <a:solidFill>
@@ -3516,8 +3564,8 @@
                 <a:avLst>
                   <a:gd name="adj1" fmla="val 41417"/>
                   <a:gd name="adj2" fmla="val 106334"/>
-                  <a:gd name="adj3" fmla="val 110984"/>
-                  <a:gd name="adj4" fmla="val 243680"/>
+                  <a:gd name="adj3" fmla="val 91151"/>
+                  <a:gd name="adj4" fmla="val 196905"/>
                 </a:avLst>
               </a:prstGeom>
               <a:noFill/>
@@ -3562,7 +3610,39 @@
                       <a:schemeClr val="tx1"/>
                     </a:solidFill>
                   </a:rPr>
-                  <a:t>Sync / FX grid -- </a:t>
+                  <a:t>Sync </a:t>
+                </a:r>
+                <a:r>
+                  <a:rPr lang="en-US" sz="1200" dirty="0" smtClean="0">
+                    <a:solidFill>
+                      <a:schemeClr val="tx1"/>
+                    </a:solidFill>
+                  </a:rPr>
+                  <a:t>/ </a:t>
+                </a:r>
+                <a:r>
+                  <a:rPr lang="en-US" sz="1200" dirty="0" smtClean="0">
+                    <a:solidFill>
+                      <a:schemeClr val="tx1"/>
+                    </a:solidFill>
+                  </a:rPr>
+                  <a:t>Pad </a:t>
+                </a:r>
+                <a:r>
+                  <a:rPr lang="en-US" sz="1200" dirty="0" err="1" smtClean="0">
+                    <a:solidFill>
+                      <a:schemeClr val="tx1"/>
+                    </a:solidFill>
+                  </a:rPr>
+                  <a:t>param</a:t>
+                </a:r>
+                <a:r>
+                  <a:rPr lang="en-US" sz="1200" dirty="0" smtClean="0">
+                    <a:solidFill>
+                      <a:schemeClr val="tx1"/>
+                    </a:solidFill>
+                  </a:rPr>
+                  <a:t> -- </a:t>
                 </a:r>
                 <a:endParaRPr lang="en-US" sz="1200" dirty="0">
                   <a:solidFill>
@@ -3733,12 +3813,20 @@
             <a:p>
               <a:pPr algn="r"/>
               <a:r>
+                <a:rPr lang="en-US" sz="1200" b="1" dirty="0" smtClean="0">
+                  <a:solidFill>
+                    <a:schemeClr val="tx1"/>
+                  </a:solidFill>
+                </a:rPr>
+                <a:t>Bass</a:t>
+              </a:r>
+              <a:r>
                 <a:rPr lang="en-US" sz="1200" dirty="0" smtClean="0">
                   <a:solidFill>
                     <a:schemeClr val="tx1"/>
                   </a:solidFill>
                 </a:rPr>
-                <a:t>Bass / </a:t>
+                <a:t> / </a:t>
               </a:r>
               <a:br>
                 <a:rPr lang="en-US" sz="1200" dirty="0" smtClean="0">
@@ -3753,15 +3841,7 @@
                     <a:schemeClr val="tx1"/>
                   </a:solidFill>
                 </a:rPr>
-                <a:t>Echo</a:t>
-              </a:r>
-              <a:r>
-                <a:rPr lang="en-US" sz="1200" dirty="0" smtClean="0">
-                  <a:solidFill>
-                    <a:schemeClr val="tx1"/>
-                  </a:solidFill>
-                </a:rPr>
-                <a:t> Depth</a:t>
+                <a:t>FX Depth / FX </a:t>
               </a:r>
               <a:endParaRPr lang="en-US" sz="1200" dirty="0">
                 <a:solidFill>
@@ -3871,12 +3951,38 @@
               <a:lstStyle/>
               <a:p>
                 <a:r>
+                  <a:rPr lang="en-US" sz="1200" b="1" dirty="0" smtClean="0">
+                    <a:solidFill>
+                      <a:schemeClr val="tx1"/>
+                    </a:solidFill>
+                  </a:rPr>
+                  <a:t>Browser </a:t>
+                </a:r>
+                <a:r>
                   <a:rPr lang="en-US" sz="1200" dirty="0" smtClean="0">
                     <a:solidFill>
                       <a:schemeClr val="tx1"/>
                     </a:solidFill>
                   </a:rPr>
-                  <a:t>Cycle LEDs</a:t>
+                  <a:t>/ </a:t>
+                </a:r>
+              </a:p>
+              <a:p>
+                <a:r>
+                  <a:rPr lang="en-US" sz="1200" dirty="0" smtClean="0">
+                    <a:solidFill>
+                      <a:schemeClr val="tx1"/>
+                    </a:solidFill>
+                  </a:rPr>
+                  <a:t>Cycle </a:t>
+                </a:r>
+                <a:r>
+                  <a:rPr lang="en-US" sz="1200" dirty="0" smtClean="0">
+                    <a:solidFill>
+                      <a:schemeClr val="tx1"/>
+                    </a:solidFill>
+                  </a:rPr>
+                  <a:t>LEDs</a:t>
                 </a:r>
                 <a:endParaRPr lang="en-US" sz="1200" dirty="0">
                   <a:solidFill>
@@ -3933,12 +4039,35 @@
               <a:lstStyle/>
               <a:p>
                 <a:r>
+                  <a:rPr lang="en-US" sz="1200" b="1" dirty="0" smtClean="0">
+                    <a:solidFill>
+                      <a:schemeClr val="tx1"/>
+                    </a:solidFill>
+                  </a:rPr>
+                  <a:t>Load </a:t>
+                </a:r>
+                <a:endParaRPr lang="en-US" sz="1200" b="1" dirty="0" smtClean="0">
+                  <a:solidFill>
+                    <a:schemeClr val="tx1"/>
+                  </a:solidFill>
+                </a:endParaRPr>
+              </a:p>
+              <a:p>
+                <a:r>
                   <a:rPr lang="en-US" sz="1200" dirty="0" smtClean="0">
                     <a:solidFill>
                       <a:schemeClr val="tx1"/>
                     </a:solidFill>
                   </a:rPr>
-                  <a:t>Load / Unload</a:t>
+                  <a:t>/ </a:t>
+                </a:r>
+                <a:r>
+                  <a:rPr lang="en-US" sz="1200" dirty="0" smtClean="0">
+                    <a:solidFill>
+                      <a:schemeClr val="tx1"/>
+                    </a:solidFill>
+                  </a:rPr>
+                  <a:t>Unload</a:t>
                 </a:r>
                 <a:endParaRPr lang="en-US" sz="1200" dirty="0">
                   <a:solidFill>
@@ -3956,15 +4085,15 @@
             </p:nvSpPr>
             <p:spPr>
               <a:xfrm>
-                <a:off x="4958579" y="1819401"/>
-                <a:ext cx="905727" cy="148603"/>
+                <a:off x="4958579" y="1615792"/>
+                <a:ext cx="905727" cy="354059"/>
               </a:xfrm>
               <a:prstGeom prst="accentCallout1">
                 <a:avLst>
                   <a:gd name="adj1" fmla="val 41417"/>
                   <a:gd name="adj2" fmla="val 106334"/>
-                  <a:gd name="adj3" fmla="val 183388"/>
-                  <a:gd name="adj4" fmla="val 163564"/>
+                  <a:gd name="adj3" fmla="val 135562"/>
+                  <a:gd name="adj4" fmla="val 166057"/>
                 </a:avLst>
               </a:prstGeom>
               <a:noFill/>
@@ -3996,6 +4125,22 @@
               <a:p>
                 <a:pPr algn="r"/>
                 <a:r>
+                  <a:rPr lang="en-US" sz="1200" b="1" dirty="0" err="1" smtClean="0">
+                    <a:solidFill>
+                      <a:schemeClr val="tx1"/>
+                    </a:solidFill>
+                  </a:rPr>
+                  <a:t>ColorFX</a:t>
+                </a:r>
+                <a:r>
+                  <a:rPr lang="en-US" sz="1200" dirty="0" smtClean="0">
+                    <a:solidFill>
+                      <a:schemeClr val="tx1"/>
+                    </a:solidFill>
+                  </a:rPr>
+                  <a:t> / </a:t>
+                </a:r>
+                <a:r>
                   <a:rPr lang="en-US" sz="1200" dirty="0" err="1" smtClean="0">
                     <a:solidFill>
                       <a:schemeClr val="tx1"/>
@@ -4010,21 +4155,6 @@
                     </a:solidFill>
                   </a:rPr>
                   <a:t>/</a:t>
-                </a:r>
-                <a:br>
-                  <a:rPr lang="en-US" sz="1200" dirty="0" smtClean="0">
-                    <a:solidFill>
-                      <a:schemeClr val="tx1"/>
-                    </a:solidFill>
-                  </a:rPr>
-                </a:br>
-                <a:r>
-                  <a:rPr lang="en-US" sz="1200" dirty="0" smtClean="0">
-                    <a:solidFill>
-                      <a:schemeClr val="tx1"/>
-                    </a:solidFill>
-                  </a:rPr>
-                  <a:t>FX depth</a:t>
                 </a:r>
                 <a:endParaRPr lang="en-US" sz="1200" dirty="0">
                   <a:solidFill>
@@ -4047,8 +4177,8 @@
               </a:xfrm>
               <a:prstGeom prst="accentCallout1">
                 <a:avLst>
-                  <a:gd name="adj1" fmla="val 41417"/>
-                  <a:gd name="adj2" fmla="val 106334"/>
+                  <a:gd name="adj1" fmla="val 48556"/>
+                  <a:gd name="adj2" fmla="val 112388"/>
                   <a:gd name="adj3" fmla="val 121029"/>
                   <a:gd name="adj4" fmla="val 211977"/>
                 </a:avLst>
@@ -4082,14 +4212,14 @@
               <a:p>
                 <a:pPr algn="r"/>
                 <a:r>
-                  <a:rPr lang="en-US" sz="1200" dirty="0" smtClean="0">
+                  <a:rPr lang="en-US" sz="1200" b="1" dirty="0" smtClean="0">
                     <a:solidFill>
                       <a:schemeClr val="tx1"/>
                     </a:solidFill>
                   </a:rPr>
-                  <a:t>Filter/  Gain</a:t>
+                  <a:t>Gain</a:t>
                 </a:r>
-                <a:endParaRPr lang="en-US" sz="1200" dirty="0">
+                <a:endParaRPr lang="en-US" sz="1200" b="1" dirty="0">
                   <a:solidFill>
                     <a:schemeClr val="tx1"/>
                   </a:solidFill>
@@ -4137,7 +4267,7 @@
         </p:nvGrpSpPr>
         <p:grpSpPr>
           <a:xfrm>
-            <a:off x="5105400" y="149348"/>
+            <a:off x="255990" y="149347"/>
             <a:ext cx="2796907" cy="2922405"/>
             <a:chOff x="5210911" y="149348"/>
             <a:chExt cx="2796907" cy="2922405"/>
@@ -4171,11 +4301,7 @@
               </a:r>
               <a:r>
                 <a:rPr lang="en-US" sz="2400" i="1" u="sng" dirty="0" smtClean="0"/>
-                <a:t>: </a:t>
-              </a:r>
-              <a:r>
-                <a:rPr lang="en-US" sz="2400" i="1" u="sng" dirty="0" smtClean="0"/>
-                <a:t>Shifts</a:t>
+                <a:t>: Shifts</a:t>
               </a:r>
               <a:endParaRPr lang="en-US" sz="2400" i="1" u="sng" dirty="0"/>
             </a:p>
@@ -4321,9 +4447,9 @@
             <p:grpSpPr>
               <a:xfrm>
                 <a:off x="6579854" y="1905000"/>
-                <a:ext cx="2256932" cy="1093021"/>
+                <a:ext cx="2268230" cy="1093021"/>
                 <a:chOff x="9306235" y="697842"/>
-                <a:chExt cx="2256932" cy="1093021"/>
+                <a:chExt cx="2268230" cy="1093021"/>
               </a:xfrm>
             </p:grpSpPr>
             <p:pic>
@@ -4347,7 +4473,7 @@
               </p:blipFill>
               <p:spPr bwMode="auto">
                 <a:xfrm>
-                  <a:off x="10457473" y="810618"/>
+                  <a:off x="10468771" y="810618"/>
                   <a:ext cx="1105694" cy="980245"/>
                 </a:xfrm>
                 <a:prstGeom prst="rect">
@@ -4380,8 +4506,8 @@
                   <a:avLst>
                     <a:gd name="adj1" fmla="val 41417"/>
                     <a:gd name="adj2" fmla="val 106334"/>
-                    <a:gd name="adj3" fmla="val 284005"/>
-                    <a:gd name="adj4" fmla="val 205405"/>
+                    <a:gd name="adj3" fmla="val 178900"/>
+                    <a:gd name="adj4" fmla="val 172720"/>
                   </a:avLst>
                 </a:prstGeom>
                 <a:noFill/>
@@ -4431,105 +4557,90 @@
           </p:grpSp>
         </p:grpSp>
       </p:grpSp>
-      <p:grpSp>
-        <p:nvGrpSpPr>
-          <p:cNvPr id="14" name="Group 13"/>
-          <p:cNvGrpSpPr/>
+      <p:sp>
+        <p:nvSpPr>
+          <p:cNvPr id="25" name="TextBox 24"/>
+          <p:cNvSpPr txBox="1"/>
           <p:nvPr/>
-        </p:nvGrpSpPr>
-        <p:grpSpPr>
+        </p:nvSpPr>
+        <p:spPr>
           <a:xfrm>
-            <a:off x="220361" y="149348"/>
-            <a:ext cx="4504039" cy="4828040"/>
-            <a:chOff x="220361" y="149348"/>
-            <a:chExt cx="4504039" cy="4828040"/>
+            <a:off x="3810000" y="149347"/>
+            <a:ext cx="1782732" cy="461665"/>
           </a:xfrm>
-        </p:grpSpPr>
-        <p:sp>
-          <p:nvSpPr>
-            <p:cNvPr id="25" name="TextBox 24"/>
-            <p:cNvSpPr txBox="1"/>
-            <p:nvPr/>
-          </p:nvSpPr>
-          <p:spPr>
-            <a:xfrm>
-              <a:off x="220361" y="149348"/>
-              <a:ext cx="1782732" cy="461665"/>
-            </a:xfrm>
-            <a:prstGeom prst="rect">
-              <a:avLst/>
-            </a:prstGeom>
-            <a:noFill/>
-          </p:spPr>
-          <p:txBody>
-            <a:bodyPr wrap="none" rtlCol="0">
-              <a:spAutoFit/>
-            </a:bodyPr>
-            <a:lstStyle/>
-            <a:p>
-              <a:r>
-                <a:rPr lang="en-US" sz="2400" i="1" u="sng" dirty="0" smtClean="0"/>
-                <a:t>PAD MODES:</a:t>
-              </a:r>
-              <a:endParaRPr lang="en-US" sz="2400" i="1" u="sng" dirty="0"/>
-            </a:p>
-          </p:txBody>
-        </p:sp>
-        <p:pic>
-          <p:nvPicPr>
-            <p:cNvPr id="3074" name="Picture 2"/>
-            <p:cNvPicPr>
-              <a:picLocks noChangeAspect="1" noChangeArrowheads="1"/>
-            </p:cNvPicPr>
-            <p:nvPr/>
-          </p:nvPicPr>
-          <p:blipFill>
-            <a:blip r:embed="rId3">
-              <a:extLst>
-                <a:ext uri="{28A0092B-C50C-407E-A947-70E740481C1C}">
-                  <a14:useLocalDpi xmlns:a14="http://schemas.microsoft.com/office/drawing/2010/main" val="0"/>
-                </a:ext>
-              </a:extLst>
-            </a:blip>
-            <a:srcRect/>
-            <a:stretch>
-              <a:fillRect/>
-            </a:stretch>
-          </p:blipFill>
-          <p:spPr bwMode="auto">
-            <a:xfrm>
-              <a:off x="530089" y="630304"/>
-              <a:ext cx="4194311" cy="4347084"/>
-            </a:xfrm>
-            <a:prstGeom prst="rect">
-              <a:avLst/>
-            </a:prstGeom>
-            <a:noFill/>
-            <a:ln>
-              <a:noFill/>
-            </a:ln>
+          <a:prstGeom prst="rect">
+            <a:avLst/>
+          </a:prstGeom>
+          <a:noFill/>
+        </p:spPr>
+        <p:txBody>
+          <a:bodyPr wrap="none" rtlCol="0">
+            <a:spAutoFit/>
+          </a:bodyPr>
+          <a:lstStyle/>
+          <a:p>
+            <a:r>
+              <a:rPr lang="en-US" sz="2400" i="1" u="sng" dirty="0" smtClean="0"/>
+              <a:t>PAD MODES:</a:t>
+            </a:r>
+            <a:endParaRPr lang="en-US" sz="2400" i="1" u="sng" dirty="0"/>
+          </a:p>
+        </p:txBody>
+      </p:sp>
+      <p:pic>
+        <p:nvPicPr>
+          <p:cNvPr id="1026" name="Picture 2"/>
+          <p:cNvPicPr>
+            <a:picLocks noChangeAspect="1" noChangeArrowheads="1"/>
+          </p:cNvPicPr>
+          <p:nvPr/>
+        </p:nvPicPr>
+        <p:blipFill>
+          <a:blip r:embed="rId3">
             <a:extLst>
-              <a:ext uri="{909E8E84-426E-40DD-AFC4-6F175D3DCCD1}">
-                <a14:hiddenFill xmlns:a14="http://schemas.microsoft.com/office/drawing/2010/main">
-                  <a:solidFill>
-                    <a:schemeClr val="accent1"/>
-                  </a:solidFill>
-                </a14:hiddenFill>
-              </a:ext>
-              <a:ext uri="{91240B29-F687-4F45-9708-019B960494DF}">
-                <a14:hiddenLine xmlns:a14="http://schemas.microsoft.com/office/drawing/2010/main" w="9525">
-                  <a:solidFill>
-                    <a:schemeClr val="tx1"/>
-                  </a:solidFill>
-                  <a:miter lim="800000"/>
-                  <a:headEnd/>
-                  <a:tailEnd/>
-                </a14:hiddenLine>
+              <a:ext uri="{28A0092B-C50C-407E-A947-70E740481C1C}">
+                <a14:useLocalDpi xmlns:a14="http://schemas.microsoft.com/office/drawing/2010/main" val="0"/>
               </a:ext>
             </a:extLst>
-          </p:spPr>
-        </p:pic>
-      </p:grpSp>
+          </a:blip>
+          <a:srcRect/>
+          <a:stretch>
+            <a:fillRect/>
+          </a:stretch>
+        </p:blipFill>
+        <p:spPr bwMode="auto">
+          <a:xfrm>
+            <a:off x="4123267" y="611012"/>
+            <a:ext cx="3962652" cy="6075068"/>
+          </a:xfrm>
+          <a:prstGeom prst="rect">
+            <a:avLst/>
+          </a:prstGeom>
+          <a:noFill/>
+          <a:ln>
+            <a:noFill/>
+          </a:ln>
+          <a:extLst>
+            <a:ext uri="{909E8E84-426E-40DD-AFC4-6F175D3DCCD1}">
+              <a14:hiddenFill xmlns:a14="http://schemas.microsoft.com/office/drawing/2010/main">
+                <a:solidFill>
+                  <a:schemeClr val="accent1"/>
+                </a:solidFill>
+              </a14:hiddenFill>
+            </a:ext>
+            <a:ext uri="{91240B29-F687-4F45-9708-019B960494DF}">
+              <a14:hiddenLine xmlns:a14="http://schemas.microsoft.com/office/drawing/2010/main" w="9525">
+                <a:solidFill>
+                  <a:schemeClr val="tx1"/>
+                </a:solidFill>
+                <a:miter lim="800000"/>
+                <a:headEnd/>
+                <a:tailEnd/>
+              </a14:hiddenLine>
+            </a:ext>
+          </a:extLst>
+        </p:spPr>
+      </p:pic>
     </p:spTree>
     <p:extLst>
       <p:ext uri="{BB962C8B-B14F-4D97-AF65-F5344CB8AC3E}">

</xml_diff>